<commit_message>
Minor fixes in directory api slides
</commit_message>
<xml_diff>
--- a/PRESENTATIONS/2020-10-online-f2f/2020-10-20-WoT-F2F-Discovery-DirectoryAPI-Tavakolizadeh.pptx
+++ b/PRESENTATIONS/2020-10-online-f2f/2020-10-20-WoT-F2F-Discovery-DirectoryAPI-Tavakolizadeh.pptx
@@ -219,7 +219,7 @@
           <a:p>
             <a:fld id="{8389B5DD-0274-BF45-B4C5-62E173E8F634}" type="datetimeFigureOut">
               <a:rPr lang="en-US" smtClean="0"/>
-              <a:t>10/19/20</a:t>
+              <a:t>10/20/20</a:t>
             </a:fld>
             <a:endParaRPr lang="en-US"/>
           </a:p>
@@ -837,7 +837,7 @@
           <a:p>
             <a:fld id="{2F93E591-CC8D-C74E-8EED-098A7FB5E64D}" type="datetime1">
               <a:rPr lang="en-CA" smtClean="0"/>
-              <a:t>2020-10-19</a:t>
+              <a:t>2020-10-20</a:t>
             </a:fld>
             <a:endParaRPr lang="en-US"/>
           </a:p>
@@ -1107,7 +1107,7 @@
           <a:p>
             <a:fld id="{2E1BC118-574D-594E-ABEA-A7C82666C9AB}" type="datetime1">
               <a:rPr lang="en-CA" smtClean="0"/>
-              <a:t>2020-10-19</a:t>
+              <a:t>2020-10-20</a:t>
             </a:fld>
             <a:endParaRPr lang="en-US"/>
           </a:p>
@@ -1475,7 +1475,7 @@
           <a:p>
             <a:fld id="{B929AB1E-7FD9-0A40-B7C0-508CCACB3E9A}" type="datetime1">
               <a:rPr lang="en-CA" smtClean="0"/>
-              <a:t>2020-10-19</a:t>
+              <a:t>2020-10-20</a:t>
             </a:fld>
             <a:endParaRPr lang="en-US"/>
           </a:p>
@@ -1708,7 +1708,7 @@
           <a:p>
             <a:fld id="{5AE8723F-57EA-4C47-97B9-92AFDEEF85DC}" type="datetime1">
               <a:rPr lang="en-CA" smtClean="0"/>
-              <a:t>2020-10-19</a:t>
+              <a:t>2020-10-20</a:t>
             </a:fld>
             <a:endParaRPr lang="en-US"/>
           </a:p>
@@ -2041,7 +2041,7 @@
           <a:p>
             <a:fld id="{B2B00E5D-EC04-AA49-8D52-0FCB6E08F63D}" type="datetime1">
               <a:rPr lang="en-CA" smtClean="0"/>
-              <a:t>2020-10-19</a:t>
+              <a:t>2020-10-20</a:t>
             </a:fld>
             <a:endParaRPr lang="en-US"/>
           </a:p>
@@ -2516,7 +2516,7 @@
           <a:p>
             <a:fld id="{FF90905C-10FF-8047-AA7E-6DC7E8B6AF51}" type="datetime1">
               <a:rPr lang="en-CA" smtClean="0"/>
-              <a:t>2020-10-19</a:t>
+              <a:t>2020-10-20</a:t>
             </a:fld>
             <a:endParaRPr lang="en-US"/>
           </a:p>
@@ -2723,7 +2723,7 @@
           <a:p>
             <a:fld id="{D1CE86E2-4400-D342-BEEC-F9C1ADF6F9F7}" type="datetime1">
               <a:rPr lang="en-CA" smtClean="0"/>
-              <a:t>2020-10-19</a:t>
+              <a:t>2020-10-20</a:t>
             </a:fld>
             <a:endParaRPr lang="en-US"/>
           </a:p>
@@ -2893,7 +2893,7 @@
           <a:p>
             <a:fld id="{74358A08-7221-7F45-8378-69D5559861DD}" type="datetime1">
               <a:rPr lang="en-CA" smtClean="0"/>
-              <a:t>2020-10-19</a:t>
+              <a:t>2020-10-20</a:t>
             </a:fld>
             <a:endParaRPr lang="en-US"/>
           </a:p>
@@ -3266,7 +3266,7 @@
           <a:p>
             <a:fld id="{08C20FDB-303D-8A4E-83B7-226DD88B97BD}" type="datetime1">
               <a:rPr lang="en-CA" smtClean="0"/>
-              <a:t>2020-10-19</a:t>
+              <a:t>2020-10-20</a:t>
             </a:fld>
             <a:endParaRPr lang="en-US"/>
           </a:p>
@@ -3619,7 +3619,7 @@
           <a:p>
             <a:fld id="{0A9EBA37-9D18-D34A-A88D-1B00AA06E95C}" type="datetime1">
               <a:rPr lang="en-CA" smtClean="0"/>
-              <a:t>2020-10-19</a:t>
+              <a:t>2020-10-20</a:t>
             </a:fld>
             <a:endParaRPr lang="en-US"/>
           </a:p>
@@ -3960,7 +3960,7 @@
             <a:fld id="{B73A2E78-F38A-E046-ACDB-668F070D1EF6}" type="datetime1">
               <a:rPr lang="en-CA" smtClean="0"/>
               <a:pPr/>
-              <a:t>2020-10-19</a:t>
+              <a:t>2020-10-20</a:t>
             </a:fld>
             <a:endParaRPr lang="en-US" dirty="0"/>
           </a:p>
@@ -4742,7 +4742,7 @@
           <a:p>
             <a:fld id="{B929AB1E-7FD9-0A40-B7C0-508CCACB3E9A}" type="datetime1">
               <a:rPr lang="en-CA" smtClean="0"/>
-              <a:t>2020-10-19</a:t>
+              <a:t>2020-10-20</a:t>
             </a:fld>
             <a:endParaRPr lang="en-US"/>
           </a:p>
@@ -4763,7 +4763,7 @@
         <p:spPr>
           <a:xfrm>
             <a:off x="6066818" y="1690688"/>
-            <a:ext cx="5888478" cy="3108543"/>
+            <a:ext cx="5888478" cy="3323987"/>
           </a:xfrm>
           <a:prstGeom prst="rect">
             <a:avLst/>
@@ -4782,6 +4782,12 @@
           <a:p>
             <a:r>
               <a:rPr lang="en-GB" sz="1400" dirty="0"/>
+              <a:t>Error response example:</a:t>
+            </a:r>
+          </a:p>
+          <a:p>
+            <a:r>
+              <a:rPr lang="en-GB" sz="1400" dirty="0"/>
               <a:t>{</a:t>
             </a:r>
           </a:p>
@@ -4910,7 +4916,7 @@
         <p:spPr>
           <a:xfrm>
             <a:off x="953311" y="4971355"/>
-            <a:ext cx="7000378" cy="1384995"/>
+            <a:ext cx="6019340" cy="1200329"/>
           </a:xfrm>
           <a:prstGeom prst="rect">
             <a:avLst/>
@@ -4923,64 +4929,64 @@
           <a:lstStyle/>
           <a:p>
             <a:r>
-              <a:rPr lang="en-GB" sz="1400" dirty="0"/>
+              <a:rPr lang="en-GB" sz="1200" dirty="0"/>
               <a:t>Related Issues:</a:t>
             </a:r>
           </a:p>
           <a:p>
             <a:r>
-              <a:rPr lang="en-GB" sz="1400" dirty="0"/>
+              <a:rPr lang="en-GB" sz="1200" dirty="0"/>
               <a:t>Define error responses: </a:t>
             </a:r>
             <a:r>
-              <a:rPr lang="en-GB" sz="1400" dirty="0">
+              <a:rPr lang="en-GB" sz="1200" dirty="0">
                 <a:hlinkClick r:id="rId2"/>
               </a:rPr>
               <a:t>https://github.com/w3c/wot-discovery/issues/44</a:t>
             </a:r>
             <a:br>
-              <a:rPr lang="en-GB" sz="1400" dirty="0"/>
+              <a:rPr lang="en-GB" sz="1200" dirty="0"/>
             </a:br>
             <a:r>
-              <a:rPr lang="en-GB" sz="1400" dirty="0"/>
+              <a:rPr lang="en-GB" sz="1200" dirty="0"/>
               <a:t>Error conditions for form requests: </a:t>
             </a:r>
             <a:r>
-              <a:rPr lang="en-GB" sz="1400" dirty="0">
+              <a:rPr lang="en-GB" sz="1200" dirty="0">
                 <a:hlinkClick r:id="rId3"/>
               </a:rPr>
               <a:t>https://github.com/w3c/wot-thing-description/issues/303</a:t>
             </a:r>
             <a:br>
-              <a:rPr lang="en-GB" sz="1400" dirty="0"/>
+              <a:rPr lang="en-GB" sz="1200" dirty="0"/>
             </a:br>
             <a:r>
-              <a:rPr lang="en-GB" sz="1400" dirty="0"/>
+              <a:rPr lang="en-GB" sz="1200" dirty="0"/>
               <a:t>Error Handling: </a:t>
             </a:r>
             <a:r>
-              <a:rPr lang="en-GB" sz="1400" dirty="0">
+              <a:rPr lang="en-GB" sz="1200" dirty="0">
                 <a:hlinkClick r:id="rId4"/>
               </a:rPr>
               <a:t>https://github.com/w3c/wot-scripting-api/issues/200</a:t>
             </a:r>
-            <a:endParaRPr lang="en-GB" sz="1400" dirty="0"/>
-          </a:p>
-          <a:p>
-            <a:endParaRPr lang="en-GB" sz="1400" dirty="0"/>
-          </a:p>
-          <a:p>
-            <a:r>
-              <a:rPr lang="en-GB" sz="1400" dirty="0"/>
+            <a:endParaRPr lang="en-GB" sz="1200" dirty="0"/>
+          </a:p>
+          <a:p>
+            <a:endParaRPr lang="en-GB" sz="1200" dirty="0"/>
+          </a:p>
+          <a:p>
+            <a:r>
+              <a:rPr lang="en-GB" sz="1200" dirty="0"/>
               <a:t>* Problem Details: </a:t>
             </a:r>
             <a:r>
-              <a:rPr lang="en-GB" sz="1400" dirty="0">
+              <a:rPr lang="en-GB" sz="1200" dirty="0">
                 <a:hlinkClick r:id="rId5"/>
               </a:rPr>
               <a:t>https://tools.ietf.org/html/rfc7807</a:t>
             </a:r>
-            <a:endParaRPr lang="en-GB" sz="1400" dirty="0"/>
+            <a:endParaRPr lang="en-GB" sz="1200" dirty="0"/>
           </a:p>
         </p:txBody>
       </p:sp>
@@ -5201,15 +5207,7 @@
             </a:pPr>
             <a:r>
               <a:rPr lang="en-GB" sz="1800" dirty="0"/>
-              <a:t>TTL </a:t>
-            </a:r>
-            <a:r>
-              <a:rPr lang="en-GB" sz="1800" dirty="0" err="1"/>
-              <a:t>Usercase</a:t>
-            </a:r>
-            <a:r>
-              <a:rPr lang="en-GB" sz="1800" dirty="0"/>
-              <a:t>: </a:t>
+              <a:t>TTL Use cases: </a:t>
             </a:r>
             <a:r>
               <a:rPr lang="en-GB" sz="1800" dirty="0">
@@ -5368,7 +5366,7 @@
           <a:p>
             <a:fld id="{B929AB1E-7FD9-0A40-B7C0-508CCACB3E9A}" type="datetime1">
               <a:rPr lang="en-CA" smtClean="0"/>
-              <a:t>2020-10-19</a:t>
+              <a:t>2020-10-20</a:t>
             </a:fld>
             <a:endParaRPr lang="en-US"/>
           </a:p>
@@ -5427,7 +5425,7 @@
           <a:p>
             <a:fld id="{BF92DA42-2970-1B4D-9C1F-77F249CD7467}" type="datetime1">
               <a:rPr lang="en-CA" smtClean="0"/>
-              <a:t>2020-10-19</a:t>
+              <a:t>2020-10-20</a:t>
             </a:fld>
             <a:endParaRPr lang="en-US" dirty="0"/>
           </a:p>
@@ -5788,7 +5786,7 @@
           <a:p>
             <a:fld id="{BF92DA42-2970-1B4D-9C1F-77F249CD7467}" type="datetime1">
               <a:rPr lang="en-CA" smtClean="0"/>
-              <a:t>2020-10-19</a:t>
+              <a:t>2020-10-20</a:t>
             </a:fld>
             <a:endParaRPr lang="en-US"/>
           </a:p>
@@ -6121,7 +6119,7 @@
           <a:p>
             <a:fld id="{B929AB1E-7FD9-0A40-B7C0-508CCACB3E9A}" type="datetime1">
               <a:rPr lang="en-CA" smtClean="0"/>
-              <a:t>2020-10-19</a:t>
+              <a:t>2020-10-20</a:t>
             </a:fld>
             <a:endParaRPr lang="en-US"/>
           </a:p>
@@ -6206,7 +6204,12 @@
             <p:ph idx="1"/>
           </p:nvPr>
         </p:nvSpPr>
-        <p:spPr/>
+        <p:spPr>
+          <a:xfrm>
+            <a:off x="838200" y="1298222"/>
+            <a:ext cx="10515600" cy="4433711"/>
+          </a:xfrm>
+        </p:spPr>
         <p:txBody>
           <a:bodyPr>
             <a:normAutofit/>
@@ -6218,7 +6221,23 @@
             </a:pPr>
             <a:r>
               <a:rPr lang="en-GB" sz="1800" dirty="0"/>
-              <a:t>RESTful Create, retrieve, update, and delete (CRUD) operations:</a:t>
+              <a:t>RESTful</a:t>
+            </a:r>
+            <a:r>
+              <a:rPr lang="en-GB" sz="1800" baseline="30000" dirty="0"/>
+              <a:t>1</a:t>
+            </a:r>
+            <a:r>
+              <a:rPr lang="en-GB" sz="1800" dirty="0"/>
+              <a:t> HTTP</a:t>
+            </a:r>
+            <a:r>
+              <a:rPr lang="en-GB" sz="1800" baseline="30000" dirty="0"/>
+              <a:t>2</a:t>
+            </a:r>
+            <a:r>
+              <a:rPr lang="en-GB" sz="1800" dirty="0"/>
+              <a:t> Create, retrieve, update, and delete (CRUD) operations:</a:t>
             </a:r>
           </a:p>
           <a:p>
@@ -6235,6 +6254,10 @@
               <a:rPr lang="en-GB" sz="1800" dirty="0"/>
               <a:t>POST a TD</a:t>
             </a:r>
+            <a:r>
+              <a:rPr lang="en-GB" sz="1800" baseline="30000" dirty="0"/>
+              <a:t>3</a:t>
+            </a:r>
           </a:p>
           <a:p>
             <a:pPr lvl="1"/>
@@ -6269,6 +6292,10 @@
             <a:r>
               <a:rPr lang="en-GB" sz="1800" dirty="0"/>
               <a:t>PUT a TD</a:t>
+            </a:r>
+            <a:r>
+              <a:rPr lang="en-GB" sz="1800" baseline="30000" dirty="0"/>
+              <a:t>3</a:t>
             </a:r>
             <a:endParaRPr lang="en-GB" sz="1800" dirty="0">
               <a:solidFill>
@@ -6291,6 +6318,11 @@
               <a:rPr lang="en-GB" sz="1800" dirty="0"/>
               <a:t>PATCH a TD</a:t>
             </a:r>
+            <a:r>
+              <a:rPr lang="en-GB" sz="1800" baseline="30000" dirty="0"/>
+              <a:t>3</a:t>
+            </a:r>
+            <a:endParaRPr lang="en-GB" sz="1800" dirty="0"/>
           </a:p>
           <a:p>
             <a:pPr lvl="1"/>
@@ -6394,6 +6426,83 @@
       </p:sp>
       <p:sp>
         <p:nvSpPr>
+          <p:cNvPr id="7" name="Rectangle 6">
+            <a:extLst>
+              <a:ext uri="{FF2B5EF4-FFF2-40B4-BE49-F238E27FC236}">
+                <a16:creationId xmlns:a16="http://schemas.microsoft.com/office/drawing/2014/main" id="{1EEAE246-92E1-E445-ADA8-EFAE6D9D4B94}"/>
+              </a:ext>
+            </a:extLst>
+          </p:cNvPr>
+          <p:cNvSpPr/>
+          <p:nvPr/>
+        </p:nvSpPr>
+        <p:spPr>
+          <a:xfrm>
+            <a:off x="838200" y="5759834"/>
+            <a:ext cx="10820400" cy="646331"/>
+          </a:xfrm>
+          <a:prstGeom prst="rect">
+            <a:avLst/>
+          </a:prstGeom>
+        </p:spPr>
+        <p:txBody>
+          <a:bodyPr wrap="square">
+            <a:spAutoFit/>
+          </a:bodyPr>
+          <a:lstStyle/>
+          <a:p>
+            <a:r>
+              <a:rPr lang="en-GB" sz="1200" baseline="30000" dirty="0"/>
+              <a:t>1 </a:t>
+            </a:r>
+            <a:r>
+              <a:rPr lang="en-GB" sz="1200" dirty="0"/>
+              <a:t>RESTful Design for Internet of Things Systems: </a:t>
+            </a:r>
+            <a:r>
+              <a:rPr lang="en-GB" sz="1200" dirty="0">
+                <a:hlinkClick r:id="rId2"/>
+              </a:rPr>
+              <a:t>https://tools.ietf.org/html/draft-irtf-t2trg-rest-iot-06</a:t>
+            </a:r>
+            <a:endParaRPr lang="en-GB" sz="1200" dirty="0"/>
+          </a:p>
+          <a:p>
+            <a:r>
+              <a:rPr lang="en-GB" sz="1200" baseline="30000" dirty="0"/>
+              <a:t>2 </a:t>
+            </a:r>
+            <a:r>
+              <a:rPr lang="en-GB" sz="1200" dirty="0"/>
+              <a:t>Hypertext Transfer Protocol (HTTP/1.1): Semantics and Content: </a:t>
+            </a:r>
+            <a:r>
+              <a:rPr lang="en-GB" sz="1200" dirty="0">
+                <a:hlinkClick r:id="rId3"/>
+              </a:rPr>
+              <a:t>https://tools.ietf.org/html/rfc7231</a:t>
+            </a:r>
+            <a:endParaRPr lang="en-GB" sz="1200" dirty="0"/>
+          </a:p>
+          <a:p>
+            <a:r>
+              <a:rPr lang="en-GB" sz="1200" baseline="30000" dirty="0"/>
+              <a:t>3</a:t>
+            </a:r>
+            <a:r>
+              <a:rPr lang="en-GB" sz="1200" dirty="0"/>
+              <a:t> [Recommended] TD validation against TD </a:t>
+            </a:r>
+            <a:r>
+              <a:rPr lang="en-GB" sz="1200" dirty="0" err="1"/>
+              <a:t>JSONSchema</a:t>
+            </a:r>
+            <a:endParaRPr lang="en-GB" sz="1200" dirty="0"/>
+          </a:p>
+        </p:txBody>
+      </p:sp>
+      <p:sp>
+        <p:nvSpPr>
           <p:cNvPr id="6" name="Date Placeholder 5">
             <a:extLst>
               <a:ext uri="{FF2B5EF4-FFF2-40B4-BE49-F238E27FC236}">
@@ -6415,9 +6524,9 @@
           <a:p>
             <a:fld id="{B929AB1E-7FD9-0A40-B7C0-508CCACB3E9A}" type="datetime1">
               <a:rPr lang="en-CA" smtClean="0"/>
-              <a:t>2020-10-19</a:t>
+              <a:t>2020-10-20</a:t>
             </a:fld>
-            <a:endParaRPr lang="en-US"/>
+            <a:endParaRPr lang="en-US" dirty="0"/>
           </a:p>
         </p:txBody>
       </p:sp>
@@ -6710,7 +6819,7 @@
           <a:p>
             <a:fld id="{B929AB1E-7FD9-0A40-B7C0-508CCACB3E9A}" type="datetime1">
               <a:rPr lang="en-CA" smtClean="0"/>
-              <a:t>2020-10-19</a:t>
+              <a:t>2020-10-20</a:t>
             </a:fld>
             <a:endParaRPr lang="en-US"/>
           </a:p>
@@ -6731,7 +6840,7 @@
         <p:spPr>
           <a:xfrm>
             <a:off x="838200" y="5617686"/>
-            <a:ext cx="9220200" cy="738664"/>
+            <a:ext cx="9220200" cy="646331"/>
           </a:xfrm>
           <a:prstGeom prst="rect">
             <a:avLst/>
@@ -6744,7 +6853,7 @@
           <a:lstStyle/>
           <a:p>
             <a:r>
-              <a:rPr lang="en-GB" sz="1400" dirty="0">
+              <a:rPr lang="en-GB" sz="1200" dirty="0">
                 <a:solidFill>
                   <a:srgbClr val="24292E"/>
                 </a:solidFill>
@@ -6754,7 +6863,7 @@
           </a:p>
           <a:p>
             <a:r>
-              <a:rPr lang="en-GB" sz="1400" dirty="0">
+              <a:rPr lang="en-GB" sz="1200" dirty="0">
                 <a:solidFill>
                   <a:srgbClr val="24292E"/>
                 </a:solidFill>
@@ -6762,7 +6871,7 @@
               <a:t>Handle huge set of Thing Descriptions: </a:t>
             </a:r>
             <a:r>
-              <a:rPr lang="en-GB" sz="1400" dirty="0">
+              <a:rPr lang="en-GB" sz="1200" dirty="0">
                 <a:solidFill>
                   <a:srgbClr val="24292E"/>
                 </a:solidFill>
@@ -6770,7 +6879,7 @@
               </a:rPr>
               <a:t>https://github.com/w3c/wot-discovery/issues/16</a:t>
             </a:r>
-            <a:endParaRPr lang="en-GB" sz="1400" dirty="0">
+            <a:endParaRPr lang="en-GB" sz="1200" dirty="0">
               <a:solidFill>
                 <a:srgbClr val="24292E"/>
               </a:solidFill>
@@ -6778,11 +6887,11 @@
           </a:p>
           <a:p>
             <a:r>
-              <a:rPr lang="en-GB" sz="1400" dirty="0"/>
+              <a:rPr lang="en-GB" sz="1200" dirty="0"/>
               <a:t>Add links section to directory information model</a:t>
             </a:r>
             <a:r>
-              <a:rPr lang="en-GB" sz="1400" dirty="0">
+              <a:rPr lang="en-GB" sz="1200" dirty="0">
                 <a:solidFill>
                   <a:srgbClr val="24292E"/>
                 </a:solidFill>
@@ -6790,7 +6899,7 @@
               <a:t>: </a:t>
             </a:r>
             <a:r>
-              <a:rPr lang="en-GB" sz="1400" dirty="0">
+              <a:rPr lang="en-GB" sz="1200" dirty="0">
                 <a:solidFill>
                   <a:srgbClr val="24292E"/>
                 </a:solidFill>
@@ -6799,7 +6908,7 @@
               <a:t>https://</a:t>
             </a:r>
             <a:r>
-              <a:rPr lang="en-GB" sz="1400" dirty="0" err="1">
+              <a:rPr lang="en-GB" sz="1200" dirty="0" err="1">
                 <a:solidFill>
                   <a:srgbClr val="24292E"/>
                 </a:solidFill>
@@ -6808,7 +6917,7 @@
               <a:t>github.com</a:t>
             </a:r>
             <a:r>
-              <a:rPr lang="en-GB" sz="1400" dirty="0">
+              <a:rPr lang="en-GB" sz="1200" dirty="0">
                 <a:solidFill>
                   <a:srgbClr val="24292E"/>
                 </a:solidFill>
@@ -6816,7 +6925,7 @@
               </a:rPr>
               <a:t>/w3c/wot-discovery/issues/34</a:t>
             </a:r>
-            <a:endParaRPr lang="en-GB" sz="1400" dirty="0"/>
+            <a:endParaRPr lang="en-GB" sz="1200" dirty="0"/>
           </a:p>
         </p:txBody>
       </p:sp>
@@ -6854,7 +6963,7 @@
           <a:p>
             <a:r>
               <a:rPr lang="en-GB" sz="1200" b="1" dirty="0"/>
-              <a:t>TD Link:</a:t>
+              <a:t>TD Link example:</a:t>
             </a:r>
           </a:p>
           <a:p>
@@ -7276,7 +7385,7 @@
           <a:p>
             <a:fld id="{B929AB1E-7FD9-0A40-B7C0-508CCACB3E9A}" type="datetime1">
               <a:rPr lang="en-CA" smtClean="0"/>
-              <a:t>2020-10-19</a:t>
+              <a:t>2020-10-20</a:t>
             </a:fld>
             <a:endParaRPr lang="en-US"/>
           </a:p>
@@ -7297,7 +7406,7 @@
         <p:spPr>
           <a:xfrm>
             <a:off x="838200" y="5617686"/>
-            <a:ext cx="9220200" cy="738664"/>
+            <a:ext cx="9220200" cy="646331"/>
           </a:xfrm>
           <a:prstGeom prst="rect">
             <a:avLst/>
@@ -7310,7 +7419,7 @@
           <a:lstStyle/>
           <a:p>
             <a:r>
-              <a:rPr lang="en-GB" sz="1400" dirty="0">
+              <a:rPr lang="en-GB" sz="1200" dirty="0">
                 <a:solidFill>
                   <a:srgbClr val="24292E"/>
                 </a:solidFill>
@@ -7320,7 +7429,7 @@
           </a:p>
           <a:p>
             <a:r>
-              <a:rPr lang="en-GB" sz="1400" dirty="0">
+              <a:rPr lang="en-GB" sz="1200" dirty="0">
                 <a:solidFill>
                   <a:srgbClr val="24292E"/>
                 </a:solidFill>
@@ -7328,7 +7437,7 @@
               <a:t>Handle huge set of Thing Descriptions: </a:t>
             </a:r>
             <a:r>
-              <a:rPr lang="en-GB" sz="1400" dirty="0">
+              <a:rPr lang="en-GB" sz="1200" dirty="0">
                 <a:solidFill>
                   <a:srgbClr val="24292E"/>
                 </a:solidFill>
@@ -7336,7 +7445,7 @@
               </a:rPr>
               <a:t>https://github.com/w3c/wot-discovery/issues/16</a:t>
             </a:r>
-            <a:endParaRPr lang="en-GB" sz="1400" dirty="0">
+            <a:endParaRPr lang="en-GB" sz="1200" dirty="0">
               <a:solidFill>
                 <a:srgbClr val="24292E"/>
               </a:solidFill>
@@ -7344,11 +7453,11 @@
           </a:p>
           <a:p>
             <a:r>
-              <a:rPr lang="en-GB" sz="1400" dirty="0"/>
+              <a:rPr lang="en-GB" sz="1200" dirty="0"/>
               <a:t>Add links section to directory information model</a:t>
             </a:r>
             <a:r>
-              <a:rPr lang="en-GB" sz="1400" dirty="0">
+              <a:rPr lang="en-GB" sz="1200" dirty="0">
                 <a:solidFill>
                   <a:srgbClr val="24292E"/>
                 </a:solidFill>
@@ -7356,7 +7465,7 @@
               <a:t>: </a:t>
             </a:r>
             <a:r>
-              <a:rPr lang="en-GB" sz="1400" dirty="0">
+              <a:rPr lang="en-GB" sz="1200" dirty="0">
                 <a:solidFill>
                   <a:srgbClr val="24292E"/>
                 </a:solidFill>
@@ -7365,7 +7474,7 @@
               <a:t>https://</a:t>
             </a:r>
             <a:r>
-              <a:rPr lang="en-GB" sz="1400" dirty="0" err="1">
+              <a:rPr lang="en-GB" sz="1200" dirty="0" err="1">
                 <a:solidFill>
                   <a:srgbClr val="24292E"/>
                 </a:solidFill>
@@ -7374,7 +7483,7 @@
               <a:t>github.com</a:t>
             </a:r>
             <a:r>
-              <a:rPr lang="en-GB" sz="1400" dirty="0">
+              <a:rPr lang="en-GB" sz="1200" dirty="0">
                 <a:solidFill>
                   <a:srgbClr val="24292E"/>
                 </a:solidFill>
@@ -7382,7 +7491,7 @@
               </a:rPr>
               <a:t>/w3c/wot-discovery/issues/34</a:t>
             </a:r>
-            <a:endParaRPr lang="en-GB" sz="1400" dirty="0"/>
+            <a:endParaRPr lang="en-GB" sz="1200" dirty="0"/>
           </a:p>
         </p:txBody>
       </p:sp>
@@ -7622,7 +7731,7 @@
           <a:p>
             <a:fld id="{B929AB1E-7FD9-0A40-B7C0-508CCACB3E9A}" type="datetime1">
               <a:rPr lang="en-CA" smtClean="0"/>
-              <a:t>2020-10-19</a:t>
+              <a:t>2020-10-20</a:t>
             </a:fld>
             <a:endParaRPr lang="en-US"/>
           </a:p>
@@ -7630,10 +7739,10 @@
       </p:sp>
       <p:sp>
         <p:nvSpPr>
-          <p:cNvPr id="7" name="Rectangle 6">
-            <a:extLst>
-              <a:ext uri="{FF2B5EF4-FFF2-40B4-BE49-F238E27FC236}">
-                <a16:creationId xmlns:a16="http://schemas.microsoft.com/office/drawing/2014/main" id="{C0636084-E771-4945-9D9C-348725155C41}"/>
+          <p:cNvPr id="8" name="Rectangle 7">
+            <a:extLst>
+              <a:ext uri="{FF2B5EF4-FFF2-40B4-BE49-F238E27FC236}">
+                <a16:creationId xmlns:a16="http://schemas.microsoft.com/office/drawing/2014/main" id="{CBAB5A9C-14B1-0E40-A407-ED1954997562}"/>
               </a:ext>
             </a:extLst>
           </p:cNvPr>
@@ -7642,8 +7751,8 @@
         </p:nvSpPr>
         <p:spPr>
           <a:xfrm>
-            <a:off x="838200" y="5758826"/>
-            <a:ext cx="4937249" cy="307777"/>
+            <a:off x="838200" y="5218015"/>
+            <a:ext cx="6999930" cy="1200329"/>
           </a:xfrm>
           <a:prstGeom prst="rect">
             <a:avLst/>
@@ -7656,49 +7765,7 @@
           <a:lstStyle/>
           <a:p>
             <a:r>
-              <a:rPr lang="en-GB" sz="1400" dirty="0"/>
-              <a:t>* Server-Sent Events (SSE): https://www.w3.org/TR/</a:t>
-            </a:r>
-            <a:r>
-              <a:rPr lang="en-GB" sz="1400" dirty="0" err="1"/>
-              <a:t>eventsource</a:t>
-            </a:r>
-            <a:r>
-              <a:rPr lang="en-GB" sz="1400" dirty="0"/>
-              <a:t>/</a:t>
-            </a:r>
-          </a:p>
-        </p:txBody>
-      </p:sp>
-      <p:sp>
-        <p:nvSpPr>
-          <p:cNvPr id="8" name="Rectangle 7">
-            <a:extLst>
-              <a:ext uri="{FF2B5EF4-FFF2-40B4-BE49-F238E27FC236}">
-                <a16:creationId xmlns:a16="http://schemas.microsoft.com/office/drawing/2014/main" id="{CBAB5A9C-14B1-0E40-A407-ED1954997562}"/>
-              </a:ext>
-            </a:extLst>
-          </p:cNvPr>
-          <p:cNvSpPr/>
-          <p:nvPr/>
-        </p:nvSpPr>
-        <p:spPr>
-          <a:xfrm>
-            <a:off x="838200" y="4840775"/>
-            <a:ext cx="8146526" cy="738664"/>
-          </a:xfrm>
-          <a:prstGeom prst="rect">
-            <a:avLst/>
-          </a:prstGeom>
-        </p:spPr>
-        <p:txBody>
-          <a:bodyPr wrap="none">
-            <a:spAutoFit/>
-          </a:bodyPr>
-          <a:lstStyle/>
-          <a:p>
-            <a:r>
-              <a:rPr lang="en-GB" sz="1400" dirty="0">
+              <a:rPr lang="en-GB" sz="1200" dirty="0">
                 <a:solidFill>
                   <a:srgbClr val="24292E"/>
                 </a:solidFill>
@@ -7709,7 +7776,7 @@
           </a:p>
           <a:p>
             <a:r>
-              <a:rPr lang="en-GB" sz="1400" dirty="0">
+              <a:rPr lang="en-GB" sz="1200" dirty="0">
                 <a:solidFill>
                   <a:srgbClr val="24292E"/>
                 </a:solidFill>
@@ -7718,7 +7785,7 @@
               <a:t>Decide how to securely do notifications from a Directory: </a:t>
             </a:r>
             <a:r>
-              <a:rPr lang="en-GB" sz="1400" dirty="0">
+              <a:rPr lang="en-GB" sz="1200" dirty="0">
                 <a:solidFill>
                   <a:srgbClr val="24292E"/>
                 </a:solidFill>
@@ -7727,7 +7794,7 @@
               </a:rPr>
               <a:t>https://github.com/w3c/wot-discovery/issues/42</a:t>
             </a:r>
-            <a:endParaRPr lang="en-GB" sz="1400" dirty="0">
+            <a:endParaRPr lang="en-GB" sz="1200" dirty="0">
               <a:solidFill>
                 <a:srgbClr val="24292E"/>
               </a:solidFill>
@@ -7736,7 +7803,7 @@
           </a:p>
           <a:p>
             <a:r>
-              <a:rPr lang="en-GB" sz="1400" dirty="0">
+              <a:rPr lang="en-GB" sz="1200" dirty="0">
                 <a:solidFill>
                   <a:srgbClr val="24292E"/>
                 </a:solidFill>
@@ -7745,7 +7812,7 @@
               <a:t>Directories should notify subscribers when a TD is updated: </a:t>
             </a:r>
             <a:r>
-              <a:rPr lang="en-GB" sz="1400" dirty="0">
+              <a:rPr lang="en-GB" sz="1200" dirty="0">
                 <a:solidFill>
                   <a:srgbClr val="24292E"/>
                 </a:solidFill>
@@ -7754,7 +7821,37 @@
               </a:rPr>
               <a:t>https://github.com/w3c/wot-discovery/issues/28</a:t>
             </a:r>
-            <a:endParaRPr lang="en-GB" sz="1400" dirty="0">
+            <a:endParaRPr lang="en-GB" sz="1200" dirty="0">
+              <a:solidFill>
+                <a:srgbClr val="24292E"/>
+              </a:solidFill>
+              <a:latin typeface="-apple-system"/>
+            </a:endParaRPr>
+          </a:p>
+          <a:p>
+            <a:endParaRPr lang="en-GB" sz="1200" dirty="0">
+              <a:solidFill>
+                <a:srgbClr val="24292E"/>
+              </a:solidFill>
+              <a:latin typeface="-apple-system"/>
+            </a:endParaRPr>
+          </a:p>
+          <a:p>
+            <a:r>
+              <a:rPr lang="en-GB" sz="1200" dirty="0"/>
+              <a:t>* Server-Sent Events (SSE): https://www.w3.org/TR/</a:t>
+            </a:r>
+            <a:r>
+              <a:rPr lang="en-GB" sz="1200" dirty="0" err="1"/>
+              <a:t>eventsource</a:t>
+            </a:r>
+            <a:r>
+              <a:rPr lang="en-GB" sz="1200" dirty="0"/>
+              <a:t>/</a:t>
+            </a:r>
+          </a:p>
+          <a:p>
+            <a:endParaRPr lang="en-GB" sz="1200" dirty="0">
               <a:solidFill>
                 <a:srgbClr val="24292E"/>
               </a:solidFill>
@@ -8130,7 +8227,7 @@
           <a:p>
             <a:fld id="{B929AB1E-7FD9-0A40-B7C0-508CCACB3E9A}" type="datetime1">
               <a:rPr lang="en-CA" smtClean="0"/>
-              <a:t>2020-10-19</a:t>
+              <a:t>2020-10-20</a:t>
             </a:fld>
             <a:endParaRPr lang="en-US"/>
           </a:p>
@@ -8151,7 +8248,7 @@
         <p:spPr>
           <a:xfrm>
             <a:off x="838200" y="5438299"/>
-            <a:ext cx="8146526" cy="738664"/>
+            <a:ext cx="6999930" cy="646331"/>
           </a:xfrm>
           <a:prstGeom prst="rect">
             <a:avLst/>
@@ -8164,7 +8261,7 @@
           <a:lstStyle/>
           <a:p>
             <a:r>
-              <a:rPr lang="en-GB" sz="1400" dirty="0">
+              <a:rPr lang="en-GB" sz="1200" dirty="0">
                 <a:solidFill>
                   <a:srgbClr val="24292E"/>
                 </a:solidFill>
@@ -8175,7 +8272,7 @@
           </a:p>
           <a:p>
             <a:r>
-              <a:rPr lang="en-GB" sz="1400" dirty="0">
+              <a:rPr lang="en-GB" sz="1200" dirty="0">
                 <a:solidFill>
                   <a:srgbClr val="24292E"/>
                 </a:solidFill>
@@ -8184,7 +8281,7 @@
               <a:t>Decide how to securely do notifications from a Directory: </a:t>
             </a:r>
             <a:r>
-              <a:rPr lang="en-GB" sz="1400" dirty="0">
+              <a:rPr lang="en-GB" sz="1200" dirty="0">
                 <a:solidFill>
                   <a:srgbClr val="24292E"/>
                 </a:solidFill>
@@ -8193,7 +8290,7 @@
               </a:rPr>
               <a:t>https://github.com/w3c/wot-discovery/issues/42</a:t>
             </a:r>
-            <a:endParaRPr lang="en-GB" sz="1400" dirty="0">
+            <a:endParaRPr lang="en-GB" sz="1200" dirty="0">
               <a:solidFill>
                 <a:srgbClr val="24292E"/>
               </a:solidFill>
@@ -8202,7 +8299,7 @@
           </a:p>
           <a:p>
             <a:r>
-              <a:rPr lang="en-GB" sz="1400" dirty="0">
+              <a:rPr lang="en-GB" sz="1200" dirty="0">
                 <a:solidFill>
                   <a:srgbClr val="24292E"/>
                 </a:solidFill>
@@ -8211,7 +8308,7 @@
               <a:t>Directories should notify subscribers when a TD is updated: </a:t>
             </a:r>
             <a:r>
-              <a:rPr lang="en-GB" sz="1400" dirty="0">
+              <a:rPr lang="en-GB" sz="1200" dirty="0">
                 <a:solidFill>
                   <a:srgbClr val="24292E"/>
                 </a:solidFill>
@@ -8220,7 +8317,7 @@
               </a:rPr>
               <a:t>https://github.com/w3c/wot-discovery/issues/28</a:t>
             </a:r>
-            <a:endParaRPr lang="en-GB" sz="1400" dirty="0">
+            <a:endParaRPr lang="en-GB" sz="1200" dirty="0">
               <a:solidFill>
                 <a:srgbClr val="24292E"/>
               </a:solidFill>
@@ -8594,7 +8691,7 @@
           <a:p>
             <a:fld id="{B929AB1E-7FD9-0A40-B7C0-508CCACB3E9A}" type="datetime1">
               <a:rPr lang="en-CA" smtClean="0"/>
-              <a:t>2020-10-19</a:t>
+              <a:t>2020-10-20</a:t>
             </a:fld>
             <a:endParaRPr lang="en-US"/>
           </a:p>
@@ -8615,7 +8712,7 @@
         <p:spPr>
           <a:xfrm>
             <a:off x="838200" y="5438299"/>
-            <a:ext cx="8146526" cy="738664"/>
+            <a:ext cx="6999930" cy="646331"/>
           </a:xfrm>
           <a:prstGeom prst="rect">
             <a:avLst/>
@@ -8628,7 +8725,7 @@
           <a:lstStyle/>
           <a:p>
             <a:r>
-              <a:rPr lang="en-GB" sz="1400" dirty="0">
+              <a:rPr lang="en-GB" sz="1200" dirty="0">
                 <a:solidFill>
                   <a:srgbClr val="24292E"/>
                 </a:solidFill>
@@ -8639,7 +8736,7 @@
           </a:p>
           <a:p>
             <a:r>
-              <a:rPr lang="en-GB" sz="1400" dirty="0">
+              <a:rPr lang="en-GB" sz="1200" dirty="0">
                 <a:solidFill>
                   <a:srgbClr val="24292E"/>
                 </a:solidFill>
@@ -8648,7 +8745,7 @@
               <a:t>Decide how to securely do notifications from a Directory: </a:t>
             </a:r>
             <a:r>
-              <a:rPr lang="en-GB" sz="1400" dirty="0">
+              <a:rPr lang="en-GB" sz="1200" dirty="0">
                 <a:solidFill>
                   <a:srgbClr val="24292E"/>
                 </a:solidFill>
@@ -8657,7 +8754,7 @@
               </a:rPr>
               <a:t>https://github.com/w3c/wot-discovery/issues/42</a:t>
             </a:r>
-            <a:endParaRPr lang="en-GB" sz="1400" dirty="0">
+            <a:endParaRPr lang="en-GB" sz="1200" dirty="0">
               <a:solidFill>
                 <a:srgbClr val="24292E"/>
               </a:solidFill>
@@ -8666,7 +8763,7 @@
           </a:p>
           <a:p>
             <a:r>
-              <a:rPr lang="en-GB" sz="1400" dirty="0">
+              <a:rPr lang="en-GB" sz="1200" dirty="0">
                 <a:solidFill>
                   <a:srgbClr val="24292E"/>
                 </a:solidFill>
@@ -8675,7 +8772,7 @@
               <a:t>Directories should notify subscribers when a TD is updated: </a:t>
             </a:r>
             <a:r>
-              <a:rPr lang="en-GB" sz="1400" dirty="0">
+              <a:rPr lang="en-GB" sz="1200" dirty="0">
                 <a:solidFill>
                   <a:srgbClr val="24292E"/>
                 </a:solidFill>
@@ -8684,7 +8781,7 @@
               </a:rPr>
               <a:t>https://github.com/w3c/wot-discovery/issues/28</a:t>
             </a:r>
-            <a:endParaRPr lang="en-GB" sz="1400" dirty="0">
+            <a:endParaRPr lang="en-GB" sz="1200" dirty="0">
               <a:solidFill>
                 <a:srgbClr val="24292E"/>
               </a:solidFill>

</xml_diff>